<commit_message>
refactor: Rename repo from HabitTracker to HabitBuilder
</commit_message>
<xml_diff>
--- a/design/design.pptx
+++ b/design/design.pptx
@@ -4,6 +4,9 @@
   <p:sldMasterIdLst>
     <p:sldMasterId id="2147483648" r:id="rId1"/>
   </p:sldMasterIdLst>
+  <p:notesMasterIdLst>
+    <p:notesMasterId r:id="rId5"/>
+  </p:notesMasterIdLst>
   <p:sldIdLst>
     <p:sldId id="256" r:id="rId2"/>
     <p:sldId id="257" r:id="rId3"/>
@@ -109,6 +112,448 @@
 </p:presentation>
 </file>
 
+<file path=ppt/notesMasters/notesMaster1.xml><?xml version="1.0" encoding="utf-8"?>
+<p:notesMaster xmlns:a="http://schemas.openxmlformats.org/drawingml/2006/main" xmlns:r="http://schemas.openxmlformats.org/officeDocument/2006/relationships" xmlns:p="http://schemas.openxmlformats.org/presentationml/2006/main">
+  <p:cSld>
+    <p:bg>
+      <p:bgRef idx="1001">
+        <a:schemeClr val="bg1"/>
+      </p:bgRef>
+    </p:bg>
+    <p:spTree>
+      <p:nvGrpSpPr>
+        <p:cNvPr id="1" name=""/>
+        <p:cNvGrpSpPr/>
+        <p:nvPr/>
+      </p:nvGrpSpPr>
+      <p:grpSpPr>
+        <a:xfrm>
+          <a:off x="0" y="0"/>
+          <a:ext cx="0" cy="0"/>
+          <a:chOff x="0" y="0"/>
+          <a:chExt cx="0" cy="0"/>
+        </a:xfrm>
+      </p:grpSpPr>
+      <p:sp>
+        <p:nvSpPr>
+          <p:cNvPr id="2" name="頁首版面配置區 1"/>
+          <p:cNvSpPr>
+            <a:spLocks noGrp="1"/>
+          </p:cNvSpPr>
+          <p:nvPr>
+            <p:ph type="hdr" sz="quarter"/>
+          </p:nvPr>
+        </p:nvSpPr>
+        <p:spPr>
+          <a:xfrm>
+            <a:off x="0" y="0"/>
+            <a:ext cx="2971800" cy="457200"/>
+          </a:xfrm>
+          <a:prstGeom prst="rect">
+            <a:avLst/>
+          </a:prstGeom>
+        </p:spPr>
+        <p:txBody>
+          <a:bodyPr vert="horz" lIns="91440" tIns="45720" rIns="91440" bIns="45720" rtlCol="0"/>
+          <a:lstStyle>
+            <a:lvl1pPr algn="l">
+              <a:defRPr sz="1200"/>
+            </a:lvl1pPr>
+          </a:lstStyle>
+          <a:p>
+            <a:endParaRPr lang="zh-TW" altLang="en-US"/>
+          </a:p>
+        </p:txBody>
+      </p:sp>
+      <p:sp>
+        <p:nvSpPr>
+          <p:cNvPr id="3" name="日期版面配置區 2"/>
+          <p:cNvSpPr>
+            <a:spLocks noGrp="1"/>
+          </p:cNvSpPr>
+          <p:nvPr>
+            <p:ph type="dt" idx="1"/>
+          </p:nvPr>
+        </p:nvSpPr>
+        <p:spPr>
+          <a:xfrm>
+            <a:off x="3884613" y="0"/>
+            <a:ext cx="2971800" cy="457200"/>
+          </a:xfrm>
+          <a:prstGeom prst="rect">
+            <a:avLst/>
+          </a:prstGeom>
+        </p:spPr>
+        <p:txBody>
+          <a:bodyPr vert="horz" lIns="91440" tIns="45720" rIns="91440" bIns="45720" rtlCol="0"/>
+          <a:lstStyle>
+            <a:lvl1pPr algn="r">
+              <a:defRPr sz="1200"/>
+            </a:lvl1pPr>
+          </a:lstStyle>
+          <a:p>
+            <a:fld id="{EAA2C0E3-9C3C-464F-A40E-128EEE83B394}" type="datetimeFigureOut">
+              <a:rPr lang="zh-TW" altLang="en-US" smtClean="0"/>
+              <a:t>2020/7/17</a:t>
+            </a:fld>
+            <a:endParaRPr lang="zh-TW" altLang="en-US"/>
+          </a:p>
+        </p:txBody>
+      </p:sp>
+      <p:sp>
+        <p:nvSpPr>
+          <p:cNvPr id="4" name="投影片圖像版面配置區 3"/>
+          <p:cNvSpPr>
+            <a:spLocks noGrp="1" noRot="1" noChangeAspect="1"/>
+          </p:cNvSpPr>
+          <p:nvPr>
+            <p:ph type="sldImg" idx="2"/>
+          </p:nvPr>
+        </p:nvSpPr>
+        <p:spPr>
+          <a:xfrm>
+            <a:off x="1143000" y="685800"/>
+            <a:ext cx="4572000" cy="3429000"/>
+          </a:xfrm>
+          <a:prstGeom prst="rect">
+            <a:avLst/>
+          </a:prstGeom>
+          <a:noFill/>
+          <a:ln w="12700">
+            <a:solidFill>
+              <a:prstClr val="black"/>
+            </a:solidFill>
+          </a:ln>
+        </p:spPr>
+        <p:txBody>
+          <a:bodyPr vert="horz" lIns="91440" tIns="45720" rIns="91440" bIns="45720" rtlCol="0" anchor="ctr"/>
+          <a:lstStyle/>
+          <a:p>
+            <a:endParaRPr lang="zh-TW" altLang="en-US"/>
+          </a:p>
+        </p:txBody>
+      </p:sp>
+      <p:sp>
+        <p:nvSpPr>
+          <p:cNvPr id="5" name="備忘稿版面配置區 4"/>
+          <p:cNvSpPr>
+            <a:spLocks noGrp="1"/>
+          </p:cNvSpPr>
+          <p:nvPr>
+            <p:ph type="body" sz="quarter" idx="3"/>
+          </p:nvPr>
+        </p:nvSpPr>
+        <p:spPr>
+          <a:xfrm>
+            <a:off x="685800" y="4343400"/>
+            <a:ext cx="5486400" cy="4114800"/>
+          </a:xfrm>
+          <a:prstGeom prst="rect">
+            <a:avLst/>
+          </a:prstGeom>
+        </p:spPr>
+        <p:txBody>
+          <a:bodyPr vert="horz" lIns="91440" tIns="45720" rIns="91440" bIns="45720" rtlCol="0">
+            <a:normAutofit/>
+          </a:bodyPr>
+          <a:lstStyle/>
+          <a:p>
+            <a:pPr lvl="0"/>
+            <a:r>
+              <a:rPr lang="zh-TW" altLang="en-US" smtClean="0"/>
+              <a:t>按一下以編輯母片文字樣式</a:t>
+            </a:r>
+          </a:p>
+          <a:p>
+            <a:pPr lvl="1"/>
+            <a:r>
+              <a:rPr lang="zh-TW" altLang="en-US" smtClean="0"/>
+              <a:t>第二層</a:t>
+            </a:r>
+          </a:p>
+          <a:p>
+            <a:pPr lvl="2"/>
+            <a:r>
+              <a:rPr lang="zh-TW" altLang="en-US" smtClean="0"/>
+              <a:t>第三層</a:t>
+            </a:r>
+          </a:p>
+          <a:p>
+            <a:pPr lvl="3"/>
+            <a:r>
+              <a:rPr lang="zh-TW" altLang="en-US" smtClean="0"/>
+              <a:t>第四層</a:t>
+            </a:r>
+          </a:p>
+          <a:p>
+            <a:pPr lvl="4"/>
+            <a:r>
+              <a:rPr lang="zh-TW" altLang="en-US" smtClean="0"/>
+              <a:t>第五層</a:t>
+            </a:r>
+            <a:endParaRPr lang="zh-TW" altLang="en-US"/>
+          </a:p>
+        </p:txBody>
+      </p:sp>
+      <p:sp>
+        <p:nvSpPr>
+          <p:cNvPr id="6" name="頁尾版面配置區 5"/>
+          <p:cNvSpPr>
+            <a:spLocks noGrp="1"/>
+          </p:cNvSpPr>
+          <p:nvPr>
+            <p:ph type="ftr" sz="quarter" idx="4"/>
+          </p:nvPr>
+        </p:nvSpPr>
+        <p:spPr>
+          <a:xfrm>
+            <a:off x="0" y="8685213"/>
+            <a:ext cx="2971800" cy="457200"/>
+          </a:xfrm>
+          <a:prstGeom prst="rect">
+            <a:avLst/>
+          </a:prstGeom>
+        </p:spPr>
+        <p:txBody>
+          <a:bodyPr vert="horz" lIns="91440" tIns="45720" rIns="91440" bIns="45720" rtlCol="0" anchor="b"/>
+          <a:lstStyle>
+            <a:lvl1pPr algn="l">
+              <a:defRPr sz="1200"/>
+            </a:lvl1pPr>
+          </a:lstStyle>
+          <a:p>
+            <a:endParaRPr lang="zh-TW" altLang="en-US"/>
+          </a:p>
+        </p:txBody>
+      </p:sp>
+      <p:sp>
+        <p:nvSpPr>
+          <p:cNvPr id="7" name="投影片編號版面配置區 6"/>
+          <p:cNvSpPr>
+            <a:spLocks noGrp="1"/>
+          </p:cNvSpPr>
+          <p:nvPr>
+            <p:ph type="sldNum" sz="quarter" idx="5"/>
+          </p:nvPr>
+        </p:nvSpPr>
+        <p:spPr>
+          <a:xfrm>
+            <a:off x="3884613" y="8685213"/>
+            <a:ext cx="2971800" cy="457200"/>
+          </a:xfrm>
+          <a:prstGeom prst="rect">
+            <a:avLst/>
+          </a:prstGeom>
+        </p:spPr>
+        <p:txBody>
+          <a:bodyPr vert="horz" lIns="91440" tIns="45720" rIns="91440" bIns="45720" rtlCol="0" anchor="b"/>
+          <a:lstStyle>
+            <a:lvl1pPr algn="r">
+              <a:defRPr sz="1200"/>
+            </a:lvl1pPr>
+          </a:lstStyle>
+          <a:p>
+            <a:fld id="{1CA6B52C-F58A-4AC9-8607-49F743E8C617}" type="slidenum">
+              <a:rPr lang="zh-TW" altLang="en-US" smtClean="0"/>
+              <a:t>‹#›</a:t>
+            </a:fld>
+            <a:endParaRPr lang="zh-TW" altLang="en-US"/>
+          </a:p>
+        </p:txBody>
+      </p:sp>
+    </p:spTree>
+  </p:cSld>
+  <p:clrMap bg1="lt1" tx1="dk1" bg2="lt2" tx2="dk2" accent1="accent1" accent2="accent2" accent3="accent3" accent4="accent4" accent5="accent5" accent6="accent6" hlink="hlink" folHlink="folHlink"/>
+  <p:notesStyle>
+    <a:lvl1pPr marL="0" algn="l" defTabSz="914400" rtl="0" eaLnBrk="1" latinLnBrk="0" hangingPunct="1">
+      <a:defRPr sz="1200" kern="1200">
+        <a:solidFill>
+          <a:schemeClr val="tx1"/>
+        </a:solidFill>
+        <a:latin typeface="+mn-lt"/>
+        <a:ea typeface="+mn-ea"/>
+        <a:cs typeface="+mn-cs"/>
+      </a:defRPr>
+    </a:lvl1pPr>
+    <a:lvl2pPr marL="457200" algn="l" defTabSz="914400" rtl="0" eaLnBrk="1" latinLnBrk="0" hangingPunct="1">
+      <a:defRPr sz="1200" kern="1200">
+        <a:solidFill>
+          <a:schemeClr val="tx1"/>
+        </a:solidFill>
+        <a:latin typeface="+mn-lt"/>
+        <a:ea typeface="+mn-ea"/>
+        <a:cs typeface="+mn-cs"/>
+      </a:defRPr>
+    </a:lvl2pPr>
+    <a:lvl3pPr marL="914400" algn="l" defTabSz="914400" rtl="0" eaLnBrk="1" latinLnBrk="0" hangingPunct="1">
+      <a:defRPr sz="1200" kern="1200">
+        <a:solidFill>
+          <a:schemeClr val="tx1"/>
+        </a:solidFill>
+        <a:latin typeface="+mn-lt"/>
+        <a:ea typeface="+mn-ea"/>
+        <a:cs typeface="+mn-cs"/>
+      </a:defRPr>
+    </a:lvl3pPr>
+    <a:lvl4pPr marL="1371600" algn="l" defTabSz="914400" rtl="0" eaLnBrk="1" latinLnBrk="0" hangingPunct="1">
+      <a:defRPr sz="1200" kern="1200">
+        <a:solidFill>
+          <a:schemeClr val="tx1"/>
+        </a:solidFill>
+        <a:latin typeface="+mn-lt"/>
+        <a:ea typeface="+mn-ea"/>
+        <a:cs typeface="+mn-cs"/>
+      </a:defRPr>
+    </a:lvl4pPr>
+    <a:lvl5pPr marL="1828800" algn="l" defTabSz="914400" rtl="0" eaLnBrk="1" latinLnBrk="0" hangingPunct="1">
+      <a:defRPr sz="1200" kern="1200">
+        <a:solidFill>
+          <a:schemeClr val="tx1"/>
+        </a:solidFill>
+        <a:latin typeface="+mn-lt"/>
+        <a:ea typeface="+mn-ea"/>
+        <a:cs typeface="+mn-cs"/>
+      </a:defRPr>
+    </a:lvl5pPr>
+    <a:lvl6pPr marL="2286000" algn="l" defTabSz="914400" rtl="0" eaLnBrk="1" latinLnBrk="0" hangingPunct="1">
+      <a:defRPr sz="1200" kern="1200">
+        <a:solidFill>
+          <a:schemeClr val="tx1"/>
+        </a:solidFill>
+        <a:latin typeface="+mn-lt"/>
+        <a:ea typeface="+mn-ea"/>
+        <a:cs typeface="+mn-cs"/>
+      </a:defRPr>
+    </a:lvl6pPr>
+    <a:lvl7pPr marL="2743200" algn="l" defTabSz="914400" rtl="0" eaLnBrk="1" latinLnBrk="0" hangingPunct="1">
+      <a:defRPr sz="1200" kern="1200">
+        <a:solidFill>
+          <a:schemeClr val="tx1"/>
+        </a:solidFill>
+        <a:latin typeface="+mn-lt"/>
+        <a:ea typeface="+mn-ea"/>
+        <a:cs typeface="+mn-cs"/>
+      </a:defRPr>
+    </a:lvl7pPr>
+    <a:lvl8pPr marL="3200400" algn="l" defTabSz="914400" rtl="0" eaLnBrk="1" latinLnBrk="0" hangingPunct="1">
+      <a:defRPr sz="1200" kern="1200">
+        <a:solidFill>
+          <a:schemeClr val="tx1"/>
+        </a:solidFill>
+        <a:latin typeface="+mn-lt"/>
+        <a:ea typeface="+mn-ea"/>
+        <a:cs typeface="+mn-cs"/>
+      </a:defRPr>
+    </a:lvl8pPr>
+    <a:lvl9pPr marL="3657600" algn="l" defTabSz="914400" rtl="0" eaLnBrk="1" latinLnBrk="0" hangingPunct="1">
+      <a:defRPr sz="1200" kern="1200">
+        <a:solidFill>
+          <a:schemeClr val="tx1"/>
+        </a:solidFill>
+        <a:latin typeface="+mn-lt"/>
+        <a:ea typeface="+mn-ea"/>
+        <a:cs typeface="+mn-cs"/>
+      </a:defRPr>
+    </a:lvl9pPr>
+  </p:notesStyle>
+</p:notesMaster>
+</file>
+
+<file path=ppt/notesSlides/notesSlide1.xml><?xml version="1.0" encoding="utf-8"?>
+<p:notes xmlns:a="http://schemas.openxmlformats.org/drawingml/2006/main" xmlns:r="http://schemas.openxmlformats.org/officeDocument/2006/relationships" xmlns:p="http://schemas.openxmlformats.org/presentationml/2006/main">
+  <p:cSld>
+    <p:spTree>
+      <p:nvGrpSpPr>
+        <p:cNvPr id="1" name=""/>
+        <p:cNvGrpSpPr/>
+        <p:nvPr/>
+      </p:nvGrpSpPr>
+      <p:grpSpPr>
+        <a:xfrm>
+          <a:off x="0" y="0"/>
+          <a:ext cx="0" cy="0"/>
+          <a:chOff x="0" y="0"/>
+          <a:chExt cx="0" cy="0"/>
+        </a:xfrm>
+      </p:grpSpPr>
+      <p:sp>
+        <p:nvSpPr>
+          <p:cNvPr id="2" name="投影片圖像版面配置區 1"/>
+          <p:cNvSpPr>
+            <a:spLocks noGrp="1" noRot="1" noChangeAspect="1"/>
+          </p:cNvSpPr>
+          <p:nvPr>
+            <p:ph type="sldImg"/>
+          </p:nvPr>
+        </p:nvSpPr>
+        <p:spPr/>
+      </p:sp>
+      <p:sp>
+        <p:nvSpPr>
+          <p:cNvPr id="3" name="備忘稿版面配置區 2"/>
+          <p:cNvSpPr>
+            <a:spLocks noGrp="1"/>
+          </p:cNvSpPr>
+          <p:nvPr>
+            <p:ph type="body" idx="1"/>
+          </p:nvPr>
+        </p:nvSpPr>
+        <p:spPr/>
+        <p:txBody>
+          <a:bodyPr>
+            <a:normAutofit/>
+          </a:bodyPr>
+          <a:lstStyle/>
+          <a:p>
+            <a:r>
+              <a:rPr lang="en-US" altLang="zh-TW" dirty="0" smtClean="0"/>
+              <a:t>I want to build a habit of ____,</a:t>
+            </a:r>
+          </a:p>
+          <a:p>
+            <a:r>
+              <a:rPr lang="en-US" altLang="zh-TW" dirty="0" smtClean="0"/>
+              <a:t>and</a:t>
+            </a:r>
+            <a:r>
+              <a:rPr lang="en-US" altLang="zh-TW" baseline="0" dirty="0" smtClean="0"/>
+              <a:t> I will use ___ days to build it.</a:t>
+            </a:r>
+            <a:endParaRPr lang="en-US" altLang="zh-TW" dirty="0" smtClean="0"/>
+          </a:p>
+        </p:txBody>
+      </p:sp>
+      <p:sp>
+        <p:nvSpPr>
+          <p:cNvPr id="4" name="投影片編號版面配置區 3"/>
+          <p:cNvSpPr>
+            <a:spLocks noGrp="1"/>
+          </p:cNvSpPr>
+          <p:nvPr>
+            <p:ph type="sldNum" sz="quarter" idx="10"/>
+          </p:nvPr>
+        </p:nvSpPr>
+        <p:spPr/>
+        <p:txBody>
+          <a:bodyPr/>
+          <a:lstStyle/>
+          <a:p>
+            <a:fld id="{1CA6B52C-F58A-4AC9-8607-49F743E8C617}" type="slidenum">
+              <a:rPr lang="zh-TW" altLang="en-US" smtClean="0"/>
+              <a:t>2</a:t>
+            </a:fld>
+            <a:endParaRPr lang="zh-TW" altLang="en-US"/>
+          </a:p>
+        </p:txBody>
+      </p:sp>
+    </p:spTree>
+  </p:cSld>
+  <p:clrMapOvr>
+    <a:masterClrMapping/>
+  </p:clrMapOvr>
+</p:notes>
+</file>
+
 <file path=ppt/slideLayouts/slideLayout1.xml><?xml version="1.0" encoding="utf-8"?>
 <p:sldLayout xmlns:a="http://schemas.openxmlformats.org/drawingml/2006/main" xmlns:r="http://schemas.openxmlformats.org/officeDocument/2006/relationships" xmlns:p="http://schemas.openxmlformats.org/presentationml/2006/main" type="title" preserve="1">
   <p:cSld name="標題投影片">
@@ -290,7 +735,8 @@
           <a:p>
             <a:fld id="{96D5D49D-C4DD-4ED4-882C-0D77237DAEFB}" type="datetimeFigureOut">
               <a:rPr lang="zh-TW" altLang="en-US" smtClean="0"/>
-              <a:t>2020/7/6</a:t>
+              <a:pPr/>
+              <a:t>2020/7/17</a:t>
             </a:fld>
             <a:endParaRPr lang="zh-TW" altLang="en-US"/>
           </a:p>
@@ -332,6 +778,7 @@
           <a:p>
             <a:fld id="{6BB35D8C-9797-40CE-881E-CAFE0471260E}" type="slidenum">
               <a:rPr lang="zh-TW" altLang="en-US" smtClean="0"/>
+              <a:pPr/>
               <a:t>‹#›</a:t>
             </a:fld>
             <a:endParaRPr lang="zh-TW" altLang="en-US"/>
@@ -455,7 +902,8 @@
           <a:p>
             <a:fld id="{96D5D49D-C4DD-4ED4-882C-0D77237DAEFB}" type="datetimeFigureOut">
               <a:rPr lang="zh-TW" altLang="en-US" smtClean="0"/>
-              <a:t>2020/7/6</a:t>
+              <a:pPr/>
+              <a:t>2020/7/17</a:t>
             </a:fld>
             <a:endParaRPr lang="zh-TW" altLang="en-US"/>
           </a:p>
@@ -497,6 +945,7 @@
           <a:p>
             <a:fld id="{6BB35D8C-9797-40CE-881E-CAFE0471260E}" type="slidenum">
               <a:rPr lang="zh-TW" altLang="en-US" smtClean="0"/>
+              <a:pPr/>
               <a:t>‹#›</a:t>
             </a:fld>
             <a:endParaRPr lang="zh-TW" altLang="en-US"/>
@@ -630,7 +1079,8 @@
           <a:p>
             <a:fld id="{96D5D49D-C4DD-4ED4-882C-0D77237DAEFB}" type="datetimeFigureOut">
               <a:rPr lang="zh-TW" altLang="en-US" smtClean="0"/>
-              <a:t>2020/7/6</a:t>
+              <a:pPr/>
+              <a:t>2020/7/17</a:t>
             </a:fld>
             <a:endParaRPr lang="zh-TW" altLang="en-US"/>
           </a:p>
@@ -672,6 +1122,7 @@
           <a:p>
             <a:fld id="{6BB35D8C-9797-40CE-881E-CAFE0471260E}" type="slidenum">
               <a:rPr lang="zh-TW" altLang="en-US" smtClean="0"/>
+              <a:pPr/>
               <a:t>‹#›</a:t>
             </a:fld>
             <a:endParaRPr lang="zh-TW" altLang="en-US"/>
@@ -795,7 +1246,8 @@
           <a:p>
             <a:fld id="{96D5D49D-C4DD-4ED4-882C-0D77237DAEFB}" type="datetimeFigureOut">
               <a:rPr lang="zh-TW" altLang="en-US" smtClean="0"/>
-              <a:t>2020/7/6</a:t>
+              <a:pPr/>
+              <a:t>2020/7/17</a:t>
             </a:fld>
             <a:endParaRPr lang="zh-TW" altLang="en-US"/>
           </a:p>
@@ -837,6 +1289,7 @@
           <a:p>
             <a:fld id="{6BB35D8C-9797-40CE-881E-CAFE0471260E}" type="slidenum">
               <a:rPr lang="zh-TW" altLang="en-US" smtClean="0"/>
+              <a:pPr/>
               <a:t>‹#›</a:t>
             </a:fld>
             <a:endParaRPr lang="zh-TW" altLang="en-US"/>
@@ -1036,7 +1489,8 @@
           <a:p>
             <a:fld id="{96D5D49D-C4DD-4ED4-882C-0D77237DAEFB}" type="datetimeFigureOut">
               <a:rPr lang="zh-TW" altLang="en-US" smtClean="0"/>
-              <a:t>2020/7/6</a:t>
+              <a:pPr/>
+              <a:t>2020/7/17</a:t>
             </a:fld>
             <a:endParaRPr lang="zh-TW" altLang="en-US"/>
           </a:p>
@@ -1078,6 +1532,7 @@
           <a:p>
             <a:fld id="{6BB35D8C-9797-40CE-881E-CAFE0471260E}" type="slidenum">
               <a:rPr lang="zh-TW" altLang="en-US" smtClean="0"/>
+              <a:pPr/>
               <a:t>‹#›</a:t>
             </a:fld>
             <a:endParaRPr lang="zh-TW" altLang="en-US"/>
@@ -1319,7 +1774,8 @@
           <a:p>
             <a:fld id="{96D5D49D-C4DD-4ED4-882C-0D77237DAEFB}" type="datetimeFigureOut">
               <a:rPr lang="zh-TW" altLang="en-US" smtClean="0"/>
-              <a:t>2020/7/6</a:t>
+              <a:pPr/>
+              <a:t>2020/7/17</a:t>
             </a:fld>
             <a:endParaRPr lang="zh-TW" altLang="en-US"/>
           </a:p>
@@ -1361,6 +1817,7 @@
           <a:p>
             <a:fld id="{6BB35D8C-9797-40CE-881E-CAFE0471260E}" type="slidenum">
               <a:rPr lang="zh-TW" altLang="en-US" smtClean="0"/>
+              <a:pPr/>
               <a:t>‹#›</a:t>
             </a:fld>
             <a:endParaRPr lang="zh-TW" altLang="en-US"/>
@@ -1736,7 +2193,8 @@
           <a:p>
             <a:fld id="{96D5D49D-C4DD-4ED4-882C-0D77237DAEFB}" type="datetimeFigureOut">
               <a:rPr lang="zh-TW" altLang="en-US" smtClean="0"/>
-              <a:t>2020/7/6</a:t>
+              <a:pPr/>
+              <a:t>2020/7/17</a:t>
             </a:fld>
             <a:endParaRPr lang="zh-TW" altLang="en-US"/>
           </a:p>
@@ -1778,6 +2236,7 @@
           <a:p>
             <a:fld id="{6BB35D8C-9797-40CE-881E-CAFE0471260E}" type="slidenum">
               <a:rPr lang="zh-TW" altLang="en-US" smtClean="0"/>
+              <a:pPr/>
               <a:t>‹#›</a:t>
             </a:fld>
             <a:endParaRPr lang="zh-TW" altLang="en-US"/>
@@ -1849,7 +2308,8 @@
           <a:p>
             <a:fld id="{96D5D49D-C4DD-4ED4-882C-0D77237DAEFB}" type="datetimeFigureOut">
               <a:rPr lang="zh-TW" altLang="en-US" smtClean="0"/>
-              <a:t>2020/7/6</a:t>
+              <a:pPr/>
+              <a:t>2020/7/17</a:t>
             </a:fld>
             <a:endParaRPr lang="zh-TW" altLang="en-US"/>
           </a:p>
@@ -1891,6 +2351,7 @@
           <a:p>
             <a:fld id="{6BB35D8C-9797-40CE-881E-CAFE0471260E}" type="slidenum">
               <a:rPr lang="zh-TW" altLang="en-US" smtClean="0"/>
+              <a:pPr/>
               <a:t>‹#›</a:t>
             </a:fld>
             <a:endParaRPr lang="zh-TW" altLang="en-US"/>
@@ -1939,7 +2400,8 @@
           <a:p>
             <a:fld id="{96D5D49D-C4DD-4ED4-882C-0D77237DAEFB}" type="datetimeFigureOut">
               <a:rPr lang="zh-TW" altLang="en-US" smtClean="0"/>
-              <a:t>2020/7/6</a:t>
+              <a:pPr/>
+              <a:t>2020/7/17</a:t>
             </a:fld>
             <a:endParaRPr lang="zh-TW" altLang="en-US"/>
           </a:p>
@@ -1981,6 +2443,7 @@
           <a:p>
             <a:fld id="{6BB35D8C-9797-40CE-881E-CAFE0471260E}" type="slidenum">
               <a:rPr lang="zh-TW" altLang="en-US" smtClean="0"/>
+              <a:pPr/>
               <a:t>‹#›</a:t>
             </a:fld>
             <a:endParaRPr lang="zh-TW" altLang="en-US"/>
@@ -2211,7 +2674,8 @@
           <a:p>
             <a:fld id="{96D5D49D-C4DD-4ED4-882C-0D77237DAEFB}" type="datetimeFigureOut">
               <a:rPr lang="zh-TW" altLang="en-US" smtClean="0"/>
-              <a:t>2020/7/6</a:t>
+              <a:pPr/>
+              <a:t>2020/7/17</a:t>
             </a:fld>
             <a:endParaRPr lang="zh-TW" altLang="en-US"/>
           </a:p>
@@ -2253,6 +2717,7 @@
           <a:p>
             <a:fld id="{6BB35D8C-9797-40CE-881E-CAFE0471260E}" type="slidenum">
               <a:rPr lang="zh-TW" altLang="en-US" smtClean="0"/>
+              <a:pPr/>
               <a:t>‹#›</a:t>
             </a:fld>
             <a:endParaRPr lang="zh-TW" altLang="en-US"/>
@@ -2459,7 +2924,8 @@
           <a:p>
             <a:fld id="{96D5D49D-C4DD-4ED4-882C-0D77237DAEFB}" type="datetimeFigureOut">
               <a:rPr lang="zh-TW" altLang="en-US" smtClean="0"/>
-              <a:t>2020/7/6</a:t>
+              <a:pPr/>
+              <a:t>2020/7/17</a:t>
             </a:fld>
             <a:endParaRPr lang="zh-TW" altLang="en-US"/>
           </a:p>
@@ -2501,6 +2967,7 @@
           <a:p>
             <a:fld id="{6BB35D8C-9797-40CE-881E-CAFE0471260E}" type="slidenum">
               <a:rPr lang="zh-TW" altLang="en-US" smtClean="0"/>
+              <a:pPr/>
               <a:t>‹#›</a:t>
             </a:fld>
             <a:endParaRPr lang="zh-TW" altLang="en-US"/>
@@ -2667,7 +3134,8 @@
           <a:p>
             <a:fld id="{96D5D49D-C4DD-4ED4-882C-0D77237DAEFB}" type="datetimeFigureOut">
               <a:rPr lang="zh-TW" altLang="en-US" smtClean="0"/>
-              <a:t>2020/7/6</a:t>
+              <a:pPr/>
+              <a:t>2020/7/17</a:t>
             </a:fld>
             <a:endParaRPr lang="zh-TW" altLang="en-US"/>
           </a:p>
@@ -2745,6 +3213,7 @@
           <a:p>
             <a:fld id="{6BB35D8C-9797-40CE-881E-CAFE0471260E}" type="slidenum">
               <a:rPr lang="zh-TW" altLang="en-US" smtClean="0"/>
+              <a:pPr/>
               <a:t>‹#›</a:t>
             </a:fld>
             <a:endParaRPr lang="zh-TW" altLang="en-US"/>
@@ -3185,57 +3654,14 @@
       </p:grpSpPr>
       <p:sp>
         <p:nvSpPr>
-          <p:cNvPr id="4" name="文字方塊 3"/>
-          <p:cNvSpPr txBox="1"/>
-          <p:nvPr/>
-        </p:nvSpPr>
-        <p:spPr>
-          <a:xfrm>
-            <a:off x="0" y="0"/>
-            <a:ext cx="2205476" cy="369332"/>
-          </a:xfrm>
-          <a:prstGeom prst="rect">
-            <a:avLst/>
-          </a:prstGeom>
-        </p:spPr>
-        <p:style>
-          <a:lnRef idx="1">
-            <a:schemeClr val="accent6"/>
-          </a:lnRef>
-          <a:fillRef idx="2">
-            <a:schemeClr val="accent6"/>
-          </a:fillRef>
-          <a:effectRef idx="1">
-            <a:schemeClr val="accent6"/>
-          </a:effectRef>
-          <a:fontRef idx="minor">
-            <a:schemeClr val="dk1"/>
-          </a:fontRef>
-        </p:style>
-        <p:txBody>
-          <a:bodyPr wrap="none" rtlCol="0">
-            <a:spAutoFit/>
-          </a:bodyPr>
-          <a:lstStyle/>
-          <a:p>
-            <a:r>
-              <a:rPr lang="en-US" altLang="zh-TW" dirty="0" smtClean="0"/>
-              <a:t>Create a habit tracker</a:t>
-            </a:r>
-            <a:endParaRPr lang="zh-TW" altLang="en-US" dirty="0"/>
-          </a:p>
-        </p:txBody>
-      </p:sp>
-      <p:sp>
-        <p:nvSpPr>
           <p:cNvPr id="5" name="文字方塊 4"/>
           <p:cNvSpPr txBox="1"/>
           <p:nvPr/>
         </p:nvSpPr>
         <p:spPr>
           <a:xfrm>
-            <a:off x="1785918" y="2500306"/>
-            <a:ext cx="6293967" cy="892552"/>
+            <a:off x="500034" y="571480"/>
+            <a:ext cx="3292248" cy="646331"/>
           </a:xfrm>
           <a:prstGeom prst="rect">
             <a:avLst/>
@@ -3249,69 +3675,33 @@
           <a:lstStyle/>
           <a:p>
             <a:r>
-              <a:rPr lang="en-US" altLang="zh-TW" sz="2600" dirty="0" smtClean="0"/>
-              <a:t>I will use               days to build a daily habit to</a:t>
-            </a:r>
-          </a:p>
-          <a:p>
-            <a:endParaRPr lang="en-US" altLang="zh-TW" sz="2600" dirty="0" smtClean="0"/>
-          </a:p>
-        </p:txBody>
-      </p:sp>
-      <p:sp>
-        <p:nvSpPr>
-          <p:cNvPr id="6" name="圓角矩形 5"/>
-          <p:cNvSpPr/>
+              <a:rPr lang="en-US" altLang="zh-TW" dirty="0" smtClean="0"/>
+              <a:t>I want to build a habit of ____,</a:t>
+            </a:r>
+          </a:p>
+          <a:p>
+            <a:r>
+              <a:rPr lang="en-US" altLang="zh-TW" dirty="0" smtClean="0"/>
+              <a:t>and I will use ___ days to build it</a:t>
+            </a:r>
+            <a:r>
+              <a:rPr lang="en-US" altLang="zh-TW" dirty="0" smtClean="0"/>
+              <a:t>.</a:t>
+            </a:r>
+            <a:endParaRPr lang="en-US" altLang="zh-TW" dirty="0" smtClean="0"/>
+          </a:p>
+        </p:txBody>
+      </p:sp>
+      <p:sp>
+        <p:nvSpPr>
+          <p:cNvPr id="6" name="文字方塊 5"/>
+          <p:cNvSpPr txBox="1"/>
           <p:nvPr/>
         </p:nvSpPr>
         <p:spPr>
           <a:xfrm>
-            <a:off x="4000496" y="4286256"/>
-            <a:ext cx="1071570" cy="500066"/>
-          </a:xfrm>
-          <a:prstGeom prst="roundRect">
-            <a:avLst/>
-          </a:prstGeom>
-        </p:spPr>
-        <p:style>
-          <a:lnRef idx="2">
-            <a:schemeClr val="accent1">
-              <a:shade val="50000"/>
-            </a:schemeClr>
-          </a:lnRef>
-          <a:fillRef idx="1">
-            <a:schemeClr val="accent1"/>
-          </a:fillRef>
-          <a:effectRef idx="0">
-            <a:schemeClr val="accent1"/>
-          </a:effectRef>
-          <a:fontRef idx="minor">
-            <a:schemeClr val="lt1"/>
-          </a:fontRef>
-        </p:style>
-        <p:txBody>
-          <a:bodyPr rtlCol="0" anchor="ctr"/>
-          <a:lstStyle/>
-          <a:p>
-            <a:pPr algn="ctr"/>
-            <a:r>
-              <a:rPr lang="en-US" altLang="zh-TW" dirty="0" smtClean="0"/>
-              <a:t>Create</a:t>
-            </a:r>
-            <a:endParaRPr lang="zh-TW" altLang="en-US" dirty="0"/>
-          </a:p>
-        </p:txBody>
-      </p:sp>
-      <p:sp>
-        <p:nvSpPr>
-          <p:cNvPr id="7" name="文字方塊 6"/>
-          <p:cNvSpPr txBox="1"/>
-          <p:nvPr/>
-        </p:nvSpPr>
-        <p:spPr>
-          <a:xfrm>
-            <a:off x="2143108" y="1000108"/>
-            <a:ext cx="4540025" cy="677108"/>
+            <a:off x="500034" y="1571612"/>
+            <a:ext cx="2644635" cy="646331"/>
           </a:xfrm>
           <a:prstGeom prst="rect">
             <a:avLst/>
@@ -3325,208 +3715,20 @@
           <a:lstStyle/>
           <a:p>
             <a:r>
-              <a:rPr lang="en-US" altLang="zh-TW" sz="3800" dirty="0" smtClean="0"/>
-              <a:t>Create a Habit Tracker</a:t>
-            </a:r>
-            <a:endParaRPr lang="zh-TW" altLang="en-US" sz="3800" dirty="0"/>
-          </a:p>
-        </p:txBody>
-      </p:sp>
-      <p:sp>
-        <p:nvSpPr>
-          <p:cNvPr id="8" name="矩形 7"/>
-          <p:cNvSpPr/>
-          <p:nvPr/>
-        </p:nvSpPr>
-        <p:spPr>
-          <a:xfrm>
-            <a:off x="3143240" y="2571744"/>
-            <a:ext cx="928694" cy="285752"/>
-          </a:xfrm>
-          <a:prstGeom prst="rect">
-            <a:avLst/>
-          </a:prstGeom>
-        </p:spPr>
-        <p:style>
-          <a:lnRef idx="2">
-            <a:schemeClr val="dk1"/>
-          </a:lnRef>
-          <a:fillRef idx="1">
-            <a:schemeClr val="lt1"/>
-          </a:fillRef>
-          <a:effectRef idx="0">
-            <a:schemeClr val="dk1"/>
-          </a:effectRef>
-          <a:fontRef idx="minor">
-            <a:schemeClr val="dk1"/>
-          </a:fontRef>
-        </p:style>
-        <p:txBody>
-          <a:bodyPr rtlCol="0" anchor="ctr"/>
-          <a:lstStyle/>
-          <a:p>
-            <a:pPr algn="ctr"/>
-            <a:endParaRPr lang="zh-TW" altLang="en-US"/>
-          </a:p>
-        </p:txBody>
-      </p:sp>
-      <p:sp>
-        <p:nvSpPr>
-          <p:cNvPr id="9" name="等腰三角形 8"/>
-          <p:cNvSpPr/>
-          <p:nvPr/>
-        </p:nvSpPr>
-        <p:spPr>
-          <a:xfrm flipV="1">
-            <a:off x="3857620" y="2643182"/>
-            <a:ext cx="142876" cy="142876"/>
-          </a:xfrm>
-          <a:prstGeom prst="triangle">
-            <a:avLst/>
-          </a:prstGeom>
-          <a:noFill/>
-          <a:ln>
-            <a:solidFill>
-              <a:schemeClr val="tx1"/>
-            </a:solidFill>
-          </a:ln>
-        </p:spPr>
-        <p:style>
-          <a:lnRef idx="2">
-            <a:schemeClr val="accent1">
-              <a:shade val="50000"/>
-            </a:schemeClr>
-          </a:lnRef>
-          <a:fillRef idx="1">
-            <a:schemeClr val="accent1"/>
-          </a:fillRef>
-          <a:effectRef idx="0">
-            <a:schemeClr val="accent1"/>
-          </a:effectRef>
-          <a:fontRef idx="minor">
-            <a:schemeClr val="lt1"/>
-          </a:fontRef>
-        </p:style>
-        <p:txBody>
-          <a:bodyPr rtlCol="0" anchor="ctr"/>
-          <a:lstStyle/>
-          <a:p>
-            <a:pPr algn="ctr"/>
-            <a:endParaRPr lang="zh-TW" altLang="en-US"/>
-          </a:p>
-        </p:txBody>
-      </p:sp>
-      <p:sp>
-        <p:nvSpPr>
-          <p:cNvPr id="10" name="矩形 9"/>
-          <p:cNvSpPr/>
-          <p:nvPr/>
-        </p:nvSpPr>
-        <p:spPr>
-          <a:xfrm>
-            <a:off x="1857356" y="3143248"/>
-            <a:ext cx="2428892" cy="285752"/>
-          </a:xfrm>
-          <a:prstGeom prst="rect">
-            <a:avLst/>
-          </a:prstGeom>
-        </p:spPr>
-        <p:style>
-          <a:lnRef idx="2">
-            <a:schemeClr val="dk1"/>
-          </a:lnRef>
-          <a:fillRef idx="1">
-            <a:schemeClr val="lt1"/>
-          </a:fillRef>
-          <a:effectRef idx="0">
-            <a:schemeClr val="dk1"/>
-          </a:effectRef>
-          <a:fontRef idx="minor">
-            <a:schemeClr val="dk1"/>
-          </a:fontRef>
-        </p:style>
-        <p:txBody>
-          <a:bodyPr rtlCol="0" anchor="ctr"/>
-          <a:lstStyle/>
-          <a:p>
-            <a:pPr algn="ctr"/>
-            <a:endParaRPr lang="zh-TW" altLang="en-US"/>
-          </a:p>
-        </p:txBody>
-      </p:sp>
-      <p:sp>
-        <p:nvSpPr>
-          <p:cNvPr id="12" name="等腰三角形 11"/>
-          <p:cNvSpPr/>
-          <p:nvPr/>
-        </p:nvSpPr>
-        <p:spPr>
-          <a:xfrm flipV="1">
-            <a:off x="4071934" y="3214686"/>
-            <a:ext cx="142876" cy="142876"/>
-          </a:xfrm>
-          <a:prstGeom prst="triangle">
-            <a:avLst/>
-          </a:prstGeom>
-          <a:noFill/>
-          <a:ln>
-            <a:solidFill>
-              <a:schemeClr val="tx1"/>
-            </a:solidFill>
-          </a:ln>
-        </p:spPr>
-        <p:style>
-          <a:lnRef idx="2">
-            <a:schemeClr val="accent1">
-              <a:shade val="50000"/>
-            </a:schemeClr>
-          </a:lnRef>
-          <a:fillRef idx="1">
-            <a:schemeClr val="accent1"/>
-          </a:fillRef>
-          <a:effectRef idx="0">
-            <a:schemeClr val="accent1"/>
-          </a:effectRef>
-          <a:fontRef idx="minor">
-            <a:schemeClr val="lt1"/>
-          </a:fontRef>
-        </p:style>
-        <p:txBody>
-          <a:bodyPr rtlCol="0" anchor="ctr"/>
-          <a:lstStyle/>
-          <a:p>
-            <a:pPr algn="ctr"/>
-            <a:endParaRPr lang="zh-TW" altLang="en-US"/>
-          </a:p>
-        </p:txBody>
-      </p:sp>
-      <p:sp>
-        <p:nvSpPr>
-          <p:cNvPr id="13" name="文字方塊 12"/>
-          <p:cNvSpPr txBox="1"/>
-          <p:nvPr/>
-        </p:nvSpPr>
-        <p:spPr>
-          <a:xfrm>
-            <a:off x="4214810" y="3079433"/>
-            <a:ext cx="269626" cy="492443"/>
-          </a:xfrm>
-          <a:prstGeom prst="rect">
-            <a:avLst/>
-          </a:prstGeom>
-          <a:noFill/>
-        </p:spPr>
-        <p:txBody>
-          <a:bodyPr wrap="none" rtlCol="0">
-            <a:spAutoFit/>
-          </a:bodyPr>
-          <a:lstStyle/>
-          <a:p>
-            <a:r>
-              <a:rPr lang="en-US" altLang="zh-TW" sz="2600" dirty="0" smtClean="0"/>
-              <a:t>.</a:t>
-            </a:r>
-            <a:endParaRPr lang="zh-TW" altLang="en-US" sz="2600" dirty="0"/>
+              <a:rPr lang="en-US" altLang="zh-TW" dirty="0" smtClean="0"/>
+              <a:t>I will use ___ days to build</a:t>
+            </a:r>
+          </a:p>
+          <a:p>
+            <a:r>
+              <a:rPr lang="en-US" altLang="zh-TW" dirty="0" smtClean="0"/>
+              <a:t>a </a:t>
+            </a:r>
+            <a:r>
+              <a:rPr lang="en-US" altLang="zh-TW" smtClean="0"/>
+              <a:t>daily habit: _____.</a:t>
+            </a:r>
+            <a:endParaRPr lang="en-US" altLang="zh-TW" dirty="0" smtClean="0"/>
           </a:p>
         </p:txBody>
       </p:sp>
@@ -3819,4 +4021,287 @@
   <a:objectDefaults/>
   <a:extraClrSchemeLst/>
 </a:theme>
+</file>
+
+<file path=ppt/theme/theme2.xml><?xml version="1.0" encoding="utf-8"?>
+<a:theme xmlns:a="http://schemas.openxmlformats.org/drawingml/2006/main" name="Office 佈景主題">
+  <a:themeElements>
+    <a:clrScheme name="Office">
+      <a:dk1>
+        <a:sysClr val="windowText" lastClr="000000"/>
+      </a:dk1>
+      <a:lt1>
+        <a:sysClr val="window" lastClr="FFFFFF"/>
+      </a:lt1>
+      <a:dk2>
+        <a:srgbClr val="1F497D"/>
+      </a:dk2>
+      <a:lt2>
+        <a:srgbClr val="EEECE1"/>
+      </a:lt2>
+      <a:accent1>
+        <a:srgbClr val="4F81BD"/>
+      </a:accent1>
+      <a:accent2>
+        <a:srgbClr val="C0504D"/>
+      </a:accent2>
+      <a:accent3>
+        <a:srgbClr val="9BBB59"/>
+      </a:accent3>
+      <a:accent4>
+        <a:srgbClr val="8064A2"/>
+      </a:accent4>
+      <a:accent5>
+        <a:srgbClr val="4BACC6"/>
+      </a:accent5>
+      <a:accent6>
+        <a:srgbClr val="F79646"/>
+      </a:accent6>
+      <a:hlink>
+        <a:srgbClr val="0000FF"/>
+      </a:hlink>
+      <a:folHlink>
+        <a:srgbClr val="800080"/>
+      </a:folHlink>
+    </a:clrScheme>
+    <a:fontScheme name="Office">
+      <a:majorFont>
+        <a:latin typeface="Calibri"/>
+        <a:ea typeface=""/>
+        <a:cs typeface=""/>
+        <a:font script="Jpan" typeface="ＭＳ Ｐゴシック"/>
+        <a:font script="Hang" typeface="맑은 고딕"/>
+        <a:font script="Hans" typeface="宋体"/>
+        <a:font script="Hant" typeface="新細明體"/>
+        <a:font script="Arab" typeface="Times New Roman"/>
+        <a:font script="Hebr" typeface="Times New Roman"/>
+        <a:font script="Thai" typeface="Angsana New"/>
+        <a:font script="Ethi" typeface="Nyala"/>
+        <a:font script="Beng" typeface="Vrinda"/>
+        <a:font script="Gujr" typeface="Shruti"/>
+        <a:font script="Khmr" typeface="MoolBoran"/>
+        <a:font script="Knda" typeface="Tunga"/>
+        <a:font script="Guru" typeface="Raavi"/>
+        <a:font script="Cans" typeface="Euphemia"/>
+        <a:font script="Cher" typeface="Plantagenet Cherokee"/>
+        <a:font script="Yiii" typeface="Microsoft Yi Baiti"/>
+        <a:font script="Tibt" typeface="Microsoft Himalaya"/>
+        <a:font script="Thaa" typeface="MV Boli"/>
+        <a:font script="Deva" typeface="Mangal"/>
+        <a:font script="Telu" typeface="Gautami"/>
+        <a:font script="Taml" typeface="Latha"/>
+        <a:font script="Syrc" typeface="Estrangelo Edessa"/>
+        <a:font script="Orya" typeface="Kalinga"/>
+        <a:font script="Mlym" typeface="Kartika"/>
+        <a:font script="Laoo" typeface="DokChampa"/>
+        <a:font script="Sinh" typeface="Iskoola Pota"/>
+        <a:font script="Mong" typeface="Mongolian Baiti"/>
+        <a:font script="Viet" typeface="Times New Roman"/>
+        <a:font script="Uigh" typeface="Microsoft Uighur"/>
+      </a:majorFont>
+      <a:minorFont>
+        <a:latin typeface="Calibri"/>
+        <a:ea typeface=""/>
+        <a:cs typeface=""/>
+        <a:font script="Jpan" typeface="ＭＳ Ｐゴシック"/>
+        <a:font script="Hang" typeface="맑은 고딕"/>
+        <a:font script="Hans" typeface="宋体"/>
+        <a:font script="Hant" typeface="新細明體"/>
+        <a:font script="Arab" typeface="Arial"/>
+        <a:font script="Hebr" typeface="Arial"/>
+        <a:font script="Thai" typeface="Cordia New"/>
+        <a:font script="Ethi" typeface="Nyala"/>
+        <a:font script="Beng" typeface="Vrinda"/>
+        <a:font script="Gujr" typeface="Shruti"/>
+        <a:font script="Khmr" typeface="DaunPenh"/>
+        <a:font script="Knda" typeface="Tunga"/>
+        <a:font script="Guru" typeface="Raavi"/>
+        <a:font script="Cans" typeface="Euphemia"/>
+        <a:font script="Cher" typeface="Plantagenet Cherokee"/>
+        <a:font script="Yiii" typeface="Microsoft Yi Baiti"/>
+        <a:font script="Tibt" typeface="Microsoft Himalaya"/>
+        <a:font script="Thaa" typeface="MV Boli"/>
+        <a:font script="Deva" typeface="Mangal"/>
+        <a:font script="Telu" typeface="Gautami"/>
+        <a:font script="Taml" typeface="Latha"/>
+        <a:font script="Syrc" typeface="Estrangelo Edessa"/>
+        <a:font script="Orya" typeface="Kalinga"/>
+        <a:font script="Mlym" typeface="Kartika"/>
+        <a:font script="Laoo" typeface="DokChampa"/>
+        <a:font script="Sinh" typeface="Iskoola Pota"/>
+        <a:font script="Mong" typeface="Mongolian Baiti"/>
+        <a:font script="Viet" typeface="Arial"/>
+        <a:font script="Uigh" typeface="Microsoft Uighur"/>
+      </a:minorFont>
+    </a:fontScheme>
+    <a:fmtScheme name="Office">
+      <a:fillStyleLst>
+        <a:solidFill>
+          <a:schemeClr val="phClr"/>
+        </a:solidFill>
+        <a:gradFill rotWithShape="1">
+          <a:gsLst>
+            <a:gs pos="0">
+              <a:schemeClr val="phClr">
+                <a:tint val="50000"/>
+                <a:satMod val="300000"/>
+              </a:schemeClr>
+            </a:gs>
+            <a:gs pos="35000">
+              <a:schemeClr val="phClr">
+                <a:tint val="37000"/>
+                <a:satMod val="300000"/>
+              </a:schemeClr>
+            </a:gs>
+            <a:gs pos="100000">
+              <a:schemeClr val="phClr">
+                <a:tint val="15000"/>
+                <a:satMod val="350000"/>
+              </a:schemeClr>
+            </a:gs>
+          </a:gsLst>
+          <a:lin ang="16200000" scaled="1"/>
+        </a:gradFill>
+        <a:gradFill rotWithShape="1">
+          <a:gsLst>
+            <a:gs pos="0">
+              <a:schemeClr val="phClr">
+                <a:shade val="51000"/>
+                <a:satMod val="130000"/>
+              </a:schemeClr>
+            </a:gs>
+            <a:gs pos="80000">
+              <a:schemeClr val="phClr">
+                <a:shade val="93000"/>
+                <a:satMod val="130000"/>
+              </a:schemeClr>
+            </a:gs>
+            <a:gs pos="100000">
+              <a:schemeClr val="phClr">
+                <a:shade val="94000"/>
+                <a:satMod val="135000"/>
+              </a:schemeClr>
+            </a:gs>
+          </a:gsLst>
+          <a:lin ang="16200000" scaled="0"/>
+        </a:gradFill>
+      </a:fillStyleLst>
+      <a:lnStyleLst>
+        <a:ln w="9525" cap="flat" cmpd="sng" algn="ctr">
+          <a:solidFill>
+            <a:schemeClr val="phClr">
+              <a:shade val="95000"/>
+              <a:satMod val="105000"/>
+            </a:schemeClr>
+          </a:solidFill>
+          <a:prstDash val="solid"/>
+        </a:ln>
+        <a:ln w="25400" cap="flat" cmpd="sng" algn="ctr">
+          <a:solidFill>
+            <a:schemeClr val="phClr"/>
+          </a:solidFill>
+          <a:prstDash val="solid"/>
+        </a:ln>
+        <a:ln w="38100" cap="flat" cmpd="sng" algn="ctr">
+          <a:solidFill>
+            <a:schemeClr val="phClr"/>
+          </a:solidFill>
+          <a:prstDash val="solid"/>
+        </a:ln>
+      </a:lnStyleLst>
+      <a:effectStyleLst>
+        <a:effectStyle>
+          <a:effectLst>
+            <a:outerShdw blurRad="40000" dist="20000" dir="5400000" rotWithShape="0">
+              <a:srgbClr val="000000">
+                <a:alpha val="38000"/>
+              </a:srgbClr>
+            </a:outerShdw>
+          </a:effectLst>
+        </a:effectStyle>
+        <a:effectStyle>
+          <a:effectLst>
+            <a:outerShdw blurRad="40000" dist="23000" dir="5400000" rotWithShape="0">
+              <a:srgbClr val="000000">
+                <a:alpha val="35000"/>
+              </a:srgbClr>
+            </a:outerShdw>
+          </a:effectLst>
+        </a:effectStyle>
+        <a:effectStyle>
+          <a:effectLst>
+            <a:outerShdw blurRad="40000" dist="23000" dir="5400000" rotWithShape="0">
+              <a:srgbClr val="000000">
+                <a:alpha val="35000"/>
+              </a:srgbClr>
+            </a:outerShdw>
+          </a:effectLst>
+          <a:scene3d>
+            <a:camera prst="orthographicFront">
+              <a:rot lat="0" lon="0" rev="0"/>
+            </a:camera>
+            <a:lightRig rig="threePt" dir="t">
+              <a:rot lat="0" lon="0" rev="1200000"/>
+            </a:lightRig>
+          </a:scene3d>
+          <a:sp3d>
+            <a:bevelT w="63500" h="25400"/>
+          </a:sp3d>
+        </a:effectStyle>
+      </a:effectStyleLst>
+      <a:bgFillStyleLst>
+        <a:solidFill>
+          <a:schemeClr val="phClr"/>
+        </a:solidFill>
+        <a:gradFill rotWithShape="1">
+          <a:gsLst>
+            <a:gs pos="0">
+              <a:schemeClr val="phClr">
+                <a:tint val="40000"/>
+                <a:satMod val="350000"/>
+              </a:schemeClr>
+            </a:gs>
+            <a:gs pos="40000">
+              <a:schemeClr val="phClr">
+                <a:tint val="45000"/>
+                <a:shade val="99000"/>
+                <a:satMod val="350000"/>
+              </a:schemeClr>
+            </a:gs>
+            <a:gs pos="100000">
+              <a:schemeClr val="phClr">
+                <a:shade val="20000"/>
+                <a:satMod val="255000"/>
+              </a:schemeClr>
+            </a:gs>
+          </a:gsLst>
+          <a:path path="circle">
+            <a:fillToRect l="50000" t="-80000" r="50000" b="180000"/>
+          </a:path>
+        </a:gradFill>
+        <a:gradFill rotWithShape="1">
+          <a:gsLst>
+            <a:gs pos="0">
+              <a:schemeClr val="phClr">
+                <a:tint val="80000"/>
+                <a:satMod val="300000"/>
+              </a:schemeClr>
+            </a:gs>
+            <a:gs pos="100000">
+              <a:schemeClr val="phClr">
+                <a:shade val="30000"/>
+                <a:satMod val="200000"/>
+              </a:schemeClr>
+            </a:gs>
+          </a:gsLst>
+          <a:path path="circle">
+            <a:fillToRect l="50000" t="50000" r="50000" b="50000"/>
+          </a:path>
+        </a:gradFill>
+      </a:bgFillStyleLst>
+    </a:fmtScheme>
+  </a:themeElements>
+  <a:objectDefaults/>
+  <a:extraClrSchemeLst/>
+</a:theme>
 </file>
</xml_diff>